<commit_message>
add data from nwe pilot (august 2021)
</commit_message>
<xml_diff>
--- a/00_general_info/second_data_aqu_01082021.pptx
+++ b/00_general_info/second_data_aqu_01082021.pptx
@@ -217,7 +217,7 @@
           <a:p>
             <a:fld id="{57D53ED9-30B8-4372-AD22-3EB701D6120F}" type="datetimeFigureOut">
               <a:rPr lang="en-US" smtClean="0"/>
-              <a:t>8/1/2021</a:t>
+              <a:t>9/14/2021</a:t>
             </a:fld>
             <a:endParaRPr lang="en-US"/>
           </a:p>
@@ -744,7 +744,7 @@
             <a:fld id="{95C89F67-48D3-4469-AA8D-C3BF278A3455}" type="datetimeFigureOut">
               <a:rPr lang="en-US" smtClean="0"/>
               <a:pPr/>
-              <a:t>8/1/2021</a:t>
+              <a:t>9/14/2021</a:t>
             </a:fld>
             <a:endParaRPr lang="en-US"/>
           </a:p>
@@ -961,7 +961,7 @@
           <a:p>
             <a:fld id="{95C89F67-48D3-4469-AA8D-C3BF278A3455}" type="datetimeFigureOut">
               <a:rPr lang="en-US" smtClean="0"/>
-              <a:t>8/1/2021</a:t>
+              <a:t>9/14/2021</a:t>
             </a:fld>
             <a:endParaRPr lang="en-US"/>
           </a:p>
@@ -1171,7 +1171,7 @@
           <a:p>
             <a:fld id="{95C89F67-48D3-4469-AA8D-C3BF278A3455}" type="datetimeFigureOut">
               <a:rPr lang="en-US" smtClean="0"/>
-              <a:t>8/1/2021</a:t>
+              <a:t>9/14/2021</a:t>
             </a:fld>
             <a:endParaRPr lang="en-US"/>
           </a:p>
@@ -1661,7 +1661,7 @@
           <a:p>
             <a:fld id="{95C89F67-48D3-4469-AA8D-C3BF278A3455}" type="datetimeFigureOut">
               <a:rPr lang="en-US" smtClean="0"/>
-              <a:t>8/1/2021</a:t>
+              <a:t>9/14/2021</a:t>
             </a:fld>
             <a:endParaRPr lang="en-US"/>
           </a:p>
@@ -1929,7 +1929,7 @@
           <a:p>
             <a:fld id="{95C89F67-48D3-4469-AA8D-C3BF278A3455}" type="datetimeFigureOut">
               <a:rPr lang="en-US" smtClean="0"/>
-              <a:t>8/1/2021</a:t>
+              <a:t>9/14/2021</a:t>
             </a:fld>
             <a:endParaRPr lang="en-US"/>
           </a:p>
@@ -2344,7 +2344,7 @@
           <a:p>
             <a:fld id="{95C89F67-48D3-4469-AA8D-C3BF278A3455}" type="datetimeFigureOut">
               <a:rPr lang="en-US" smtClean="0"/>
-              <a:t>8/1/2021</a:t>
+              <a:t>9/14/2021</a:t>
             </a:fld>
             <a:endParaRPr lang="en-US"/>
           </a:p>
@@ -2486,7 +2486,7 @@
           <a:p>
             <a:fld id="{95C89F67-48D3-4469-AA8D-C3BF278A3455}" type="datetimeFigureOut">
               <a:rPr lang="en-US" smtClean="0"/>
-              <a:t>8/1/2021</a:t>
+              <a:t>9/14/2021</a:t>
             </a:fld>
             <a:endParaRPr lang="en-US"/>
           </a:p>
@@ -2599,7 +2599,7 @@
           <a:p>
             <a:fld id="{95C89F67-48D3-4469-AA8D-C3BF278A3455}" type="datetimeFigureOut">
               <a:rPr lang="en-US" smtClean="0"/>
-              <a:t>8/1/2021</a:t>
+              <a:t>9/14/2021</a:t>
             </a:fld>
             <a:endParaRPr lang="en-US"/>
           </a:p>
@@ -2912,7 +2912,7 @@
           <a:p>
             <a:fld id="{95C89F67-48D3-4469-AA8D-C3BF278A3455}" type="datetimeFigureOut">
               <a:rPr lang="en-US" smtClean="0"/>
-              <a:t>8/1/2021</a:t>
+              <a:t>9/14/2021</a:t>
             </a:fld>
             <a:endParaRPr lang="en-US"/>
           </a:p>
@@ -3201,7 +3201,7 @@
           <a:p>
             <a:fld id="{95C89F67-48D3-4469-AA8D-C3BF278A3455}" type="datetimeFigureOut">
               <a:rPr lang="en-US" smtClean="0"/>
-              <a:t>8/1/2021</a:t>
+              <a:t>9/14/2021</a:t>
             </a:fld>
             <a:endParaRPr lang="en-US"/>
           </a:p>
@@ -3444,7 +3444,7 @@
           <a:p>
             <a:fld id="{95C89F67-48D3-4469-AA8D-C3BF278A3455}" type="datetimeFigureOut">
               <a:rPr lang="en-US" smtClean="0"/>
-              <a:t>8/1/2021</a:t>
+              <a:t>9/14/2021</a:t>
             </a:fld>
             <a:endParaRPr lang="en-US"/>
           </a:p>

</xml_diff>